<commit_message>
Mengirim project presentasi codigram from codihealth
</commit_message>
<xml_diff>
--- a/PPT Codigram.pptx
+++ b/PPT Codigram.pptx
@@ -5,7 +5,7 @@
     <p:sldMasterId id="2147483681" r:id="rId1"/>
   </p:sldMasterIdLst>
   <p:notesMasterIdLst>
-    <p:notesMasterId r:id="rId21"/>
+    <p:notesMasterId r:id="rId22"/>
   </p:notesMasterIdLst>
   <p:sldIdLst>
     <p:sldId id="256" r:id="rId2"/>
@@ -24,23 +24,24 @@
     <p:sldId id="283" r:id="rId15"/>
     <p:sldId id="277" r:id="rId16"/>
     <p:sldId id="295" r:id="rId17"/>
-    <p:sldId id="286" r:id="rId18"/>
-    <p:sldId id="284" r:id="rId19"/>
-    <p:sldId id="294" r:id="rId20"/>
+    <p:sldId id="296" r:id="rId18"/>
+    <p:sldId id="286" r:id="rId19"/>
+    <p:sldId id="284" r:id="rId20"/>
+    <p:sldId id="294" r:id="rId21"/>
   </p:sldIdLst>
   <p:sldSz cx="9144000" cy="5143500" type="screen16x9"/>
   <p:notesSz cx="6858000" cy="9144000"/>
   <p:embeddedFontLst>
     <p:embeddedFont>
       <p:font typeface="Krona One" panose="020B0604020202020204" charset="0"/>
-      <p:regular r:id="rId22"/>
+      <p:regular r:id="rId23"/>
     </p:embeddedFont>
     <p:embeddedFont>
       <p:font typeface="DM Sans" panose="020B0604020202020204" charset="0"/>
-      <p:regular r:id="rId23"/>
-      <p:bold r:id="rId24"/>
-      <p:italic r:id="rId25"/>
-      <p:boldItalic r:id="rId26"/>
+      <p:regular r:id="rId24"/>
+      <p:bold r:id="rId25"/>
+      <p:italic r:id="rId26"/>
+      <p:boldItalic r:id="rId27"/>
     </p:embeddedFont>
   </p:embeddedFontLst>
   <p:defaultTextStyle>
@@ -1614,6 +1615,115 @@
   <p:cSld>
     <p:spTree>
       <p:nvGrpSpPr>
+        <p:cNvPr id="1" name="Shape 722"/>
+        <p:cNvGrpSpPr/>
+        <p:nvPr/>
+      </p:nvGrpSpPr>
+      <p:grpSpPr>
+        <a:xfrm>
+          <a:off x="0" y="0"/>
+          <a:ext cx="0" cy="0"/>
+          <a:chOff x="0" y="0"/>
+          <a:chExt cx="0" cy="0"/>
+        </a:xfrm>
+      </p:grpSpPr>
+      <p:sp>
+        <p:nvSpPr>
+          <p:cNvPr id="723" name="Google Shape;723;g1069b138c28_0_115:notes"/>
+          <p:cNvSpPr>
+            <a:spLocks noGrp="1" noRot="1" noChangeAspect="1"/>
+          </p:cNvSpPr>
+          <p:nvPr>
+            <p:ph type="sldImg" idx="2"/>
+          </p:nvPr>
+        </p:nvSpPr>
+        <p:spPr>
+          <a:xfrm>
+            <a:off x="381000" y="685800"/>
+            <a:ext cx="6096000" cy="3429000"/>
+          </a:xfrm>
+          <a:custGeom>
+            <a:avLst/>
+            <a:gdLst/>
+            <a:ahLst/>
+            <a:cxnLst/>
+            <a:rect l="l" t="t" r="r" b="b"/>
+            <a:pathLst>
+              <a:path w="120000" h="120000" extrusionOk="0">
+                <a:moveTo>
+                  <a:pt x="0" y="0"/>
+                </a:moveTo>
+                <a:lnTo>
+                  <a:pt x="120000" y="0"/>
+                </a:lnTo>
+                <a:lnTo>
+                  <a:pt x="120000" y="120000"/>
+                </a:lnTo>
+                <a:lnTo>
+                  <a:pt x="0" y="120000"/>
+                </a:lnTo>
+                <a:close/>
+              </a:path>
+            </a:pathLst>
+          </a:custGeom>
+        </p:spPr>
+      </p:sp>
+      <p:sp>
+        <p:nvSpPr>
+          <p:cNvPr id="724" name="Google Shape;724;g1069b138c28_0_115:notes"/>
+          <p:cNvSpPr txBox="1">
+            <a:spLocks noGrp="1"/>
+          </p:cNvSpPr>
+          <p:nvPr>
+            <p:ph type="body" idx="1"/>
+          </p:nvPr>
+        </p:nvSpPr>
+        <p:spPr>
+          <a:xfrm>
+            <a:off x="685800" y="4343400"/>
+            <a:ext cx="5486400" cy="4114800"/>
+          </a:xfrm>
+          <a:prstGeom prst="rect">
+            <a:avLst/>
+          </a:prstGeom>
+        </p:spPr>
+        <p:txBody>
+          <a:bodyPr spcFirstLastPara="1" wrap="square" lIns="91425" tIns="91425" rIns="91425" bIns="91425" anchor="t" anchorCtr="0">
+            <a:noAutofit/>
+          </a:bodyPr>
+          <a:lstStyle/>
+          <a:p>
+            <a:pPr marL="0" lvl="0" indent="0" algn="l" rtl="0">
+              <a:spcBef>
+                <a:spcPts val="0"/>
+              </a:spcBef>
+              <a:spcAft>
+                <a:spcPts val="0"/>
+              </a:spcAft>
+              <a:buNone/>
+            </a:pPr>
+            <a:endParaRPr dirty="0"/>
+          </a:p>
+        </p:txBody>
+      </p:sp>
+    </p:spTree>
+    <p:extLst>
+      <p:ext uri="{BB962C8B-B14F-4D97-AF65-F5344CB8AC3E}">
+        <p14:creationId xmlns:p14="http://schemas.microsoft.com/office/powerpoint/2010/main" val="483632115"/>
+      </p:ext>
+    </p:extLst>
+  </p:cSld>
+  <p:clrMapOvr>
+    <a:masterClrMapping/>
+  </p:clrMapOvr>
+</p:notes>
+</file>
+
+<file path=ppt/notesSlides/notesSlide18.xml><?xml version="1.0" encoding="utf-8"?>
+<p:notes xmlns:a="http://schemas.openxmlformats.org/drawingml/2006/main" xmlns:r="http://schemas.openxmlformats.org/officeDocument/2006/relationships" xmlns:p="http://schemas.openxmlformats.org/presentationml/2006/main" showMasterSp="0" showMasterPhAnim="0">
+  <p:cSld>
+    <p:spTree>
+      <p:nvGrpSpPr>
         <p:cNvPr id="1" name="Shape 773"/>
         <p:cNvGrpSpPr/>
         <p:nvPr/>
@@ -1718,7 +1828,7 @@
 </p:notes>
 </file>
 
-<file path=ppt/notesSlides/notesSlide18.xml><?xml version="1.0" encoding="utf-8"?>
+<file path=ppt/notesSlides/notesSlide19.xml><?xml version="1.0" encoding="utf-8"?>
 <p:notes xmlns:a="http://schemas.openxmlformats.org/drawingml/2006/main" xmlns:r="http://schemas.openxmlformats.org/officeDocument/2006/relationships" xmlns:p="http://schemas.openxmlformats.org/presentationml/2006/main" showMasterSp="0" showMasterPhAnim="0">
   <p:cSld>
     <p:spTree>
@@ -1818,115 +1928,6 @@
     <p:extLst>
       <p:ext uri="{BB962C8B-B14F-4D97-AF65-F5344CB8AC3E}">
         <p14:creationId xmlns:p14="http://schemas.microsoft.com/office/powerpoint/2010/main" val="2030425590"/>
-      </p:ext>
-    </p:extLst>
-  </p:cSld>
-  <p:clrMapOvr>
-    <a:masterClrMapping/>
-  </p:clrMapOvr>
-</p:notes>
-</file>
-
-<file path=ppt/notesSlides/notesSlide19.xml><?xml version="1.0" encoding="utf-8"?>
-<p:notes xmlns:a="http://schemas.openxmlformats.org/drawingml/2006/main" xmlns:r="http://schemas.openxmlformats.org/officeDocument/2006/relationships" xmlns:p="http://schemas.openxmlformats.org/presentationml/2006/main" showMasterSp="0" showMasterPhAnim="0">
-  <p:cSld>
-    <p:spTree>
-      <p:nvGrpSpPr>
-        <p:cNvPr id="1" name="Shape 722"/>
-        <p:cNvGrpSpPr/>
-        <p:nvPr/>
-      </p:nvGrpSpPr>
-      <p:grpSpPr>
-        <a:xfrm>
-          <a:off x="0" y="0"/>
-          <a:ext cx="0" cy="0"/>
-          <a:chOff x="0" y="0"/>
-          <a:chExt cx="0" cy="0"/>
-        </a:xfrm>
-      </p:grpSpPr>
-      <p:sp>
-        <p:nvSpPr>
-          <p:cNvPr id="723" name="Google Shape;723;g1069b138c28_0_115:notes"/>
-          <p:cNvSpPr>
-            <a:spLocks noGrp="1" noRot="1" noChangeAspect="1"/>
-          </p:cNvSpPr>
-          <p:nvPr>
-            <p:ph type="sldImg" idx="2"/>
-          </p:nvPr>
-        </p:nvSpPr>
-        <p:spPr>
-          <a:xfrm>
-            <a:off x="381000" y="685800"/>
-            <a:ext cx="6096000" cy="3429000"/>
-          </a:xfrm>
-          <a:custGeom>
-            <a:avLst/>
-            <a:gdLst/>
-            <a:ahLst/>
-            <a:cxnLst/>
-            <a:rect l="l" t="t" r="r" b="b"/>
-            <a:pathLst>
-              <a:path w="120000" h="120000" extrusionOk="0">
-                <a:moveTo>
-                  <a:pt x="0" y="0"/>
-                </a:moveTo>
-                <a:lnTo>
-                  <a:pt x="120000" y="0"/>
-                </a:lnTo>
-                <a:lnTo>
-                  <a:pt x="120000" y="120000"/>
-                </a:lnTo>
-                <a:lnTo>
-                  <a:pt x="0" y="120000"/>
-                </a:lnTo>
-                <a:close/>
-              </a:path>
-            </a:pathLst>
-          </a:custGeom>
-        </p:spPr>
-      </p:sp>
-      <p:sp>
-        <p:nvSpPr>
-          <p:cNvPr id="724" name="Google Shape;724;g1069b138c28_0_115:notes"/>
-          <p:cNvSpPr txBox="1">
-            <a:spLocks noGrp="1"/>
-          </p:cNvSpPr>
-          <p:nvPr>
-            <p:ph type="body" idx="1"/>
-          </p:nvPr>
-        </p:nvSpPr>
-        <p:spPr>
-          <a:xfrm>
-            <a:off x="685800" y="4343400"/>
-            <a:ext cx="5486400" cy="4114800"/>
-          </a:xfrm>
-          <a:prstGeom prst="rect">
-            <a:avLst/>
-          </a:prstGeom>
-        </p:spPr>
-        <p:txBody>
-          <a:bodyPr spcFirstLastPara="1" wrap="square" lIns="91425" tIns="91425" rIns="91425" bIns="91425" anchor="t" anchorCtr="0">
-            <a:noAutofit/>
-          </a:bodyPr>
-          <a:lstStyle/>
-          <a:p>
-            <a:pPr marL="0" lvl="0" indent="0" algn="l" rtl="0">
-              <a:spcBef>
-                <a:spcPts val="0"/>
-              </a:spcBef>
-              <a:spcAft>
-                <a:spcPts val="0"/>
-              </a:spcAft>
-              <a:buNone/>
-            </a:pPr>
-            <a:endParaRPr dirty="0"/>
-          </a:p>
-        </p:txBody>
-      </p:sp>
-    </p:spTree>
-    <p:extLst>
-      <p:ext uri="{BB962C8B-B14F-4D97-AF65-F5344CB8AC3E}">
-        <p14:creationId xmlns:p14="http://schemas.microsoft.com/office/powerpoint/2010/main" val="2280442990"/>
       </p:ext>
     </p:extLst>
   </p:cSld>
@@ -2036,6 +2037,115 @@
     <p:extLst>
       <p:ext uri="{BB962C8B-B14F-4D97-AF65-F5344CB8AC3E}">
         <p14:creationId xmlns:p14="http://schemas.microsoft.com/office/powerpoint/2010/main" val="1493581871"/>
+      </p:ext>
+    </p:extLst>
+  </p:cSld>
+  <p:clrMapOvr>
+    <a:masterClrMapping/>
+  </p:clrMapOvr>
+</p:notes>
+</file>
+
+<file path=ppt/notesSlides/notesSlide20.xml><?xml version="1.0" encoding="utf-8"?>
+<p:notes xmlns:a="http://schemas.openxmlformats.org/drawingml/2006/main" xmlns:r="http://schemas.openxmlformats.org/officeDocument/2006/relationships" xmlns:p="http://schemas.openxmlformats.org/presentationml/2006/main" showMasterSp="0" showMasterPhAnim="0">
+  <p:cSld>
+    <p:spTree>
+      <p:nvGrpSpPr>
+        <p:cNvPr id="1" name="Shape 722"/>
+        <p:cNvGrpSpPr/>
+        <p:nvPr/>
+      </p:nvGrpSpPr>
+      <p:grpSpPr>
+        <a:xfrm>
+          <a:off x="0" y="0"/>
+          <a:ext cx="0" cy="0"/>
+          <a:chOff x="0" y="0"/>
+          <a:chExt cx="0" cy="0"/>
+        </a:xfrm>
+      </p:grpSpPr>
+      <p:sp>
+        <p:nvSpPr>
+          <p:cNvPr id="723" name="Google Shape;723;g1069b138c28_0_115:notes"/>
+          <p:cNvSpPr>
+            <a:spLocks noGrp="1" noRot="1" noChangeAspect="1"/>
+          </p:cNvSpPr>
+          <p:nvPr>
+            <p:ph type="sldImg" idx="2"/>
+          </p:nvPr>
+        </p:nvSpPr>
+        <p:spPr>
+          <a:xfrm>
+            <a:off x="381000" y="685800"/>
+            <a:ext cx="6096000" cy="3429000"/>
+          </a:xfrm>
+          <a:custGeom>
+            <a:avLst/>
+            <a:gdLst/>
+            <a:ahLst/>
+            <a:cxnLst/>
+            <a:rect l="l" t="t" r="r" b="b"/>
+            <a:pathLst>
+              <a:path w="120000" h="120000" extrusionOk="0">
+                <a:moveTo>
+                  <a:pt x="0" y="0"/>
+                </a:moveTo>
+                <a:lnTo>
+                  <a:pt x="120000" y="0"/>
+                </a:lnTo>
+                <a:lnTo>
+                  <a:pt x="120000" y="120000"/>
+                </a:lnTo>
+                <a:lnTo>
+                  <a:pt x="0" y="120000"/>
+                </a:lnTo>
+                <a:close/>
+              </a:path>
+            </a:pathLst>
+          </a:custGeom>
+        </p:spPr>
+      </p:sp>
+      <p:sp>
+        <p:nvSpPr>
+          <p:cNvPr id="724" name="Google Shape;724;g1069b138c28_0_115:notes"/>
+          <p:cNvSpPr txBox="1">
+            <a:spLocks noGrp="1"/>
+          </p:cNvSpPr>
+          <p:nvPr>
+            <p:ph type="body" idx="1"/>
+          </p:nvPr>
+        </p:nvSpPr>
+        <p:spPr>
+          <a:xfrm>
+            <a:off x="685800" y="4343400"/>
+            <a:ext cx="5486400" cy="4114800"/>
+          </a:xfrm>
+          <a:prstGeom prst="rect">
+            <a:avLst/>
+          </a:prstGeom>
+        </p:spPr>
+        <p:txBody>
+          <a:bodyPr spcFirstLastPara="1" wrap="square" lIns="91425" tIns="91425" rIns="91425" bIns="91425" anchor="t" anchorCtr="0">
+            <a:noAutofit/>
+          </a:bodyPr>
+          <a:lstStyle/>
+          <a:p>
+            <a:pPr marL="0" lvl="0" indent="0" algn="l" rtl="0">
+              <a:spcBef>
+                <a:spcPts val="0"/>
+              </a:spcBef>
+              <a:spcAft>
+                <a:spcPts val="0"/>
+              </a:spcAft>
+              <a:buNone/>
+            </a:pPr>
+            <a:endParaRPr dirty="0"/>
+          </a:p>
+        </p:txBody>
+      </p:sp>
+    </p:spTree>
+    <p:extLst>
+      <p:ext uri="{BB962C8B-B14F-4D97-AF65-F5344CB8AC3E}">
+        <p14:creationId xmlns:p14="http://schemas.microsoft.com/office/powerpoint/2010/main" val="2280442990"/>
       </p:ext>
     </p:extLst>
   </p:cSld>
@@ -17714,7 +17824,7 @@
         </p:nvSpPr>
         <p:spPr>
           <a:xfrm>
-            <a:off x="878003" y="2754848"/>
+            <a:off x="857456" y="2744574"/>
             <a:ext cx="2175873" cy="527700"/>
           </a:xfrm>
           <a:prstGeom prst="rect">
@@ -17756,7 +17866,7 @@
         </p:nvSpPr>
         <p:spPr>
           <a:xfrm>
-            <a:off x="888490" y="3040148"/>
+            <a:off x="867943" y="3029874"/>
             <a:ext cx="2154900" cy="484800"/>
           </a:xfrm>
           <a:prstGeom prst="rect">
@@ -17798,7 +17908,7 @@
         </p:nvSpPr>
         <p:spPr>
           <a:xfrm>
-            <a:off x="3376804" y="2754848"/>
+            <a:off x="3356257" y="2744574"/>
             <a:ext cx="2133900" cy="527700"/>
           </a:xfrm>
           <a:prstGeom prst="rect">
@@ -17840,7 +17950,7 @@
         </p:nvSpPr>
         <p:spPr>
           <a:xfrm>
-            <a:off x="3387290" y="3040148"/>
+            <a:off x="3366743" y="3029874"/>
             <a:ext cx="2133900" cy="484800"/>
           </a:xfrm>
           <a:prstGeom prst="rect">
@@ -17892,7 +18002,7 @@
         </p:blipFill>
         <p:spPr>
           <a:xfrm>
-            <a:off x="1461062" y="2105959"/>
+            <a:off x="1440515" y="2095685"/>
             <a:ext cx="1030725" cy="571864"/>
           </a:xfrm>
           <a:prstGeom prst="rect">
@@ -17922,7 +18032,7 @@
         </p:blipFill>
         <p:spPr>
           <a:xfrm>
-            <a:off x="4039323" y="2105959"/>
+            <a:off x="4018776" y="2095685"/>
             <a:ext cx="825797" cy="571864"/>
           </a:xfrm>
           <a:prstGeom prst="rect">
@@ -17942,7 +18052,7 @@
         </p:nvSpPr>
         <p:spPr>
           <a:xfrm>
-            <a:off x="5982822" y="2754848"/>
+            <a:off x="5962275" y="2744574"/>
             <a:ext cx="2133900" cy="527700"/>
           </a:xfrm>
           <a:prstGeom prst="rect">
@@ -17984,7 +18094,7 @@
         </p:nvSpPr>
         <p:spPr>
           <a:xfrm>
-            <a:off x="5993308" y="3040148"/>
+            <a:off x="5972761" y="3029874"/>
             <a:ext cx="2133900" cy="484800"/>
           </a:xfrm>
           <a:prstGeom prst="rect">
@@ -18036,7 +18146,7 @@
         </p:blipFill>
         <p:spPr>
           <a:xfrm>
-            <a:off x="6645341" y="2105959"/>
+            <a:off x="6624794" y="2095685"/>
             <a:ext cx="825797" cy="571864"/>
           </a:xfrm>
           <a:prstGeom prst="rect">
@@ -19400,6 +19510,224 @@
 </file>
 
 <file path=ppt/slides/slide17.xml><?xml version="1.0" encoding="utf-8"?>
+<p:sld xmlns:a="http://schemas.openxmlformats.org/drawingml/2006/main" xmlns:r="http://schemas.openxmlformats.org/officeDocument/2006/relationships" xmlns:p="http://schemas.openxmlformats.org/presentationml/2006/main">
+  <p:cSld>
+    <p:spTree>
+      <p:nvGrpSpPr>
+        <p:cNvPr id="1" name="Shape 725"/>
+        <p:cNvGrpSpPr/>
+        <p:nvPr/>
+      </p:nvGrpSpPr>
+      <p:grpSpPr>
+        <a:xfrm>
+          <a:off x="0" y="0"/>
+          <a:ext cx="0" cy="0"/>
+          <a:chOff x="0" y="0"/>
+          <a:chExt cx="0" cy="0"/>
+        </a:xfrm>
+      </p:grpSpPr>
+      <p:sp>
+        <p:nvSpPr>
+          <p:cNvPr id="726" name="Google Shape;726;p63"/>
+          <p:cNvSpPr txBox="1">
+            <a:spLocks noGrp="1"/>
+          </p:cNvSpPr>
+          <p:nvPr>
+            <p:ph type="title"/>
+          </p:nvPr>
+        </p:nvSpPr>
+        <p:spPr>
+          <a:xfrm>
+            <a:off x="720000" y="445025"/>
+            <a:ext cx="7704000" cy="572700"/>
+          </a:xfrm>
+          <a:prstGeom prst="rect">
+            <a:avLst/>
+          </a:prstGeom>
+        </p:spPr>
+        <p:txBody>
+          <a:bodyPr spcFirstLastPara="1" wrap="square" lIns="91425" tIns="91425" rIns="91425" bIns="91425" anchor="t" anchorCtr="0">
+            <a:noAutofit/>
+          </a:bodyPr>
+          <a:lstStyle/>
+          <a:p>
+            <a:pPr marL="0" lvl="0" indent="0" algn="ctr" rtl="0">
+              <a:spcBef>
+                <a:spcPts val="0"/>
+              </a:spcBef>
+              <a:spcAft>
+                <a:spcPts val="0"/>
+              </a:spcAft>
+              <a:buNone/>
+            </a:pPr>
+            <a:r>
+              <a:rPr lang="en-US" dirty="0" smtClean="0"/>
+              <a:t>Lighthouse</a:t>
+            </a:r>
+            <a:endParaRPr b="1" dirty="0"/>
+          </a:p>
+        </p:txBody>
+      </p:sp>
+      <p:sp>
+        <p:nvSpPr>
+          <p:cNvPr id="5" name="Subtitle 1"/>
+          <p:cNvSpPr>
+            <a:spLocks noGrp="1"/>
+          </p:cNvSpPr>
+          <p:nvPr>
+            <p:ph type="subTitle" idx="1"/>
+          </p:nvPr>
+        </p:nvSpPr>
+        <p:spPr>
+          <a:xfrm>
+            <a:off x="1834800" y="1523173"/>
+            <a:ext cx="5474400" cy="417900"/>
+          </a:xfrm>
+        </p:spPr>
+        <p:txBody>
+          <a:bodyPr/>
+          <a:lstStyle/>
+          <a:p>
+            <a:pPr marL="0" lvl="0" indent="0"/>
+            <a:r>
+              <a:rPr lang="en-US" dirty="0" smtClean="0"/>
+              <a:t>Lighthouse </a:t>
+            </a:r>
+            <a:r>
+              <a:rPr lang="en-US" dirty="0" err="1" smtClean="0"/>
+              <a:t>adalah</a:t>
+            </a:r>
+            <a:r>
+              <a:rPr lang="en-US" dirty="0" smtClean="0"/>
+              <a:t> </a:t>
+            </a:r>
+            <a:r>
+              <a:rPr lang="en-US" dirty="0" err="1" smtClean="0"/>
+              <a:t>alat</a:t>
+            </a:r>
+            <a:r>
+              <a:rPr lang="en-US" dirty="0" smtClean="0"/>
+              <a:t> bantu </a:t>
+            </a:r>
+            <a:r>
+              <a:rPr lang="en-US" dirty="0" err="1" smtClean="0"/>
+              <a:t>sumber</a:t>
+            </a:r>
+            <a:r>
+              <a:rPr lang="en-US" dirty="0" smtClean="0"/>
+              <a:t> </a:t>
+            </a:r>
+            <a:r>
+              <a:rPr lang="en-US" dirty="0" err="1" smtClean="0"/>
+              <a:t>terbuka</a:t>
+            </a:r>
+            <a:r>
+              <a:rPr lang="en-US" dirty="0" smtClean="0"/>
+              <a:t> </a:t>
+            </a:r>
+            <a:r>
+              <a:rPr lang="en-US" dirty="0" err="1" smtClean="0"/>
+              <a:t>otomatis</a:t>
+            </a:r>
+            <a:r>
+              <a:rPr lang="en-US" dirty="0" smtClean="0"/>
+              <a:t> </a:t>
+            </a:r>
+            <a:r>
+              <a:rPr lang="en-US" dirty="0" err="1" smtClean="0"/>
+              <a:t>untuk</a:t>
+            </a:r>
+            <a:r>
+              <a:rPr lang="en-US" dirty="0" smtClean="0"/>
+              <a:t> </a:t>
+            </a:r>
+            <a:r>
+              <a:rPr lang="en-US" dirty="0" err="1" smtClean="0"/>
+              <a:t>meningkatkan</a:t>
+            </a:r>
+            <a:r>
+              <a:rPr lang="en-US" dirty="0" smtClean="0"/>
+              <a:t> </a:t>
+            </a:r>
+            <a:r>
+              <a:rPr lang="en-US" dirty="0" err="1" smtClean="0"/>
+              <a:t>kualitas</a:t>
+            </a:r>
+            <a:r>
+              <a:rPr lang="en-US" dirty="0" smtClean="0"/>
+              <a:t> website</a:t>
+            </a:r>
+            <a:endParaRPr lang="sv-SE" dirty="0"/>
+          </a:p>
+        </p:txBody>
+      </p:sp>
+      <p:pic>
+        <p:nvPicPr>
+          <p:cNvPr id="2" name="Picture 1"/>
+          <p:cNvPicPr>
+            <a:picLocks noChangeAspect="1"/>
+          </p:cNvPicPr>
+          <p:nvPr/>
+        </p:nvPicPr>
+        <p:blipFill>
+          <a:blip r:embed="rId3">
+            <a:extLst>
+              <a:ext uri="{28A0092B-C50C-407E-A947-70E740481C1C}">
+                <a14:useLocalDpi xmlns:a14="http://schemas.microsoft.com/office/drawing/2010/main" val="0"/>
+              </a:ext>
+            </a:extLst>
+          </a:blip>
+          <a:stretch>
+            <a:fillRect/>
+          </a:stretch>
+        </p:blipFill>
+        <p:spPr>
+          <a:xfrm>
+            <a:off x="1799838" y="2635790"/>
+            <a:ext cx="5544324" cy="1762371"/>
+          </a:xfrm>
+          <a:prstGeom prst="round2DiagRect">
+            <a:avLst>
+              <a:gd name="adj1" fmla="val 16667"/>
+              <a:gd name="adj2" fmla="val 0"/>
+            </a:avLst>
+          </a:prstGeom>
+          <a:ln w="88900" cap="sq">
+            <a:solidFill>
+              <a:srgbClr val="FFFFFF"/>
+            </a:solidFill>
+            <a:miter lim="800000"/>
+          </a:ln>
+          <a:effectLst>
+            <a:outerShdw blurRad="254000" algn="tl" rotWithShape="0">
+              <a:srgbClr val="000000">
+                <a:alpha val="43000"/>
+              </a:srgbClr>
+            </a:outerShdw>
+          </a:effectLst>
+        </p:spPr>
+      </p:pic>
+    </p:spTree>
+    <p:extLst>
+      <p:ext uri="{BB962C8B-B14F-4D97-AF65-F5344CB8AC3E}">
+        <p14:creationId xmlns:p14="http://schemas.microsoft.com/office/powerpoint/2010/main" val="2882943407"/>
+      </p:ext>
+    </p:extLst>
+  </p:cSld>
+  <p:clrMapOvr>
+    <a:masterClrMapping/>
+  </p:clrMapOvr>
+  <p:timing>
+    <p:tnLst>
+      <p:par>
+        <p:cTn id="1" dur="indefinite" restart="never" nodeType="tmRoot"/>
+      </p:par>
+    </p:tnLst>
+  </p:timing>
+</p:sld>
+</file>
+
+<file path=ppt/slides/slide18.xml><?xml version="1.0" encoding="utf-8"?>
 <p:sld xmlns:a="http://schemas.openxmlformats.org/drawingml/2006/main" xmlns:r="http://schemas.openxmlformats.org/officeDocument/2006/relationships" xmlns:p="http://schemas.openxmlformats.org/presentationml/2006/main">
   <p:cSld>
     <p:spTree>
@@ -20073,7 +20401,7 @@
 </p:sld>
 </file>
 
-<file path=ppt/slides/slide18.xml><?xml version="1.0" encoding="utf-8"?>
+<file path=ppt/slides/slide19.xml><?xml version="1.0" encoding="utf-8"?>
 <p:sld xmlns:a="http://schemas.openxmlformats.org/drawingml/2006/main" xmlns:r="http://schemas.openxmlformats.org/officeDocument/2006/relationships" xmlns:p="http://schemas.openxmlformats.org/presentationml/2006/main">
   <p:cSld>
     <p:spTree>
@@ -20273,85 +20601,6 @@
 </p:sld>
 </file>
 
-<file path=ppt/slides/slide19.xml><?xml version="1.0" encoding="utf-8"?>
-<p:sld xmlns:a="http://schemas.openxmlformats.org/drawingml/2006/main" xmlns:r="http://schemas.openxmlformats.org/officeDocument/2006/relationships" xmlns:p="http://schemas.openxmlformats.org/presentationml/2006/main">
-  <p:cSld>
-    <p:spTree>
-      <p:nvGrpSpPr>
-        <p:cNvPr id="1" name="Shape 725"/>
-        <p:cNvGrpSpPr/>
-        <p:nvPr/>
-      </p:nvGrpSpPr>
-      <p:grpSpPr>
-        <a:xfrm>
-          <a:off x="0" y="0"/>
-          <a:ext cx="0" cy="0"/>
-          <a:chOff x="0" y="0"/>
-          <a:chExt cx="0" cy="0"/>
-        </a:xfrm>
-      </p:grpSpPr>
-      <p:sp>
-        <p:nvSpPr>
-          <p:cNvPr id="726" name="Google Shape;726;p63"/>
-          <p:cNvSpPr txBox="1">
-            <a:spLocks noGrp="1"/>
-          </p:cNvSpPr>
-          <p:nvPr>
-            <p:ph type="title"/>
-          </p:nvPr>
-        </p:nvSpPr>
-        <p:spPr>
-          <a:xfrm>
-            <a:off x="541323" y="2242294"/>
-            <a:ext cx="7704000" cy="572700"/>
-          </a:xfrm>
-          <a:prstGeom prst="rect">
-            <a:avLst/>
-          </a:prstGeom>
-        </p:spPr>
-        <p:txBody>
-          <a:bodyPr spcFirstLastPara="1" wrap="square" lIns="91425" tIns="91425" rIns="91425" bIns="91425" anchor="t" anchorCtr="0">
-            <a:noAutofit/>
-          </a:bodyPr>
-          <a:lstStyle/>
-          <a:p>
-            <a:pPr marL="0" lvl="0" indent="0" algn="ctr" rtl="0">
-              <a:spcBef>
-                <a:spcPts val="0"/>
-              </a:spcBef>
-              <a:spcAft>
-                <a:spcPts val="0"/>
-              </a:spcAft>
-              <a:buNone/>
-            </a:pPr>
-            <a:r>
-              <a:rPr lang="id-ID" dirty="0" smtClean="0"/>
-              <a:t>Terima Kasih</a:t>
-            </a:r>
-            <a:endParaRPr dirty="0"/>
-          </a:p>
-        </p:txBody>
-      </p:sp>
-    </p:spTree>
-    <p:extLst>
-      <p:ext uri="{BB962C8B-B14F-4D97-AF65-F5344CB8AC3E}">
-        <p14:creationId xmlns:p14="http://schemas.microsoft.com/office/powerpoint/2010/main" val="3531992725"/>
-      </p:ext>
-    </p:extLst>
-  </p:cSld>
-  <p:clrMapOvr>
-    <a:masterClrMapping/>
-  </p:clrMapOvr>
-  <p:timing>
-    <p:tnLst>
-      <p:par>
-        <p:cTn id="1" dur="indefinite" restart="never" nodeType="tmRoot"/>
-      </p:par>
-    </p:tnLst>
-  </p:timing>
-</p:sld>
-</file>
-
 <file path=ppt/slides/slide2.xml><?xml version="1.0" encoding="utf-8"?>
 <p:sld xmlns:a="http://schemas.openxmlformats.org/drawingml/2006/main" xmlns:r="http://schemas.openxmlformats.org/officeDocument/2006/relationships" xmlns:p="http://schemas.openxmlformats.org/presentationml/2006/main">
   <p:cSld>
@@ -20580,6 +20829,85 @@
         </p:spPr>
       </p:pic>
     </p:spTree>
+  </p:cSld>
+  <p:clrMapOvr>
+    <a:masterClrMapping/>
+  </p:clrMapOvr>
+  <p:timing>
+    <p:tnLst>
+      <p:par>
+        <p:cTn id="1" dur="indefinite" restart="never" nodeType="tmRoot"/>
+      </p:par>
+    </p:tnLst>
+  </p:timing>
+</p:sld>
+</file>
+
+<file path=ppt/slides/slide20.xml><?xml version="1.0" encoding="utf-8"?>
+<p:sld xmlns:a="http://schemas.openxmlformats.org/drawingml/2006/main" xmlns:r="http://schemas.openxmlformats.org/officeDocument/2006/relationships" xmlns:p="http://schemas.openxmlformats.org/presentationml/2006/main">
+  <p:cSld>
+    <p:spTree>
+      <p:nvGrpSpPr>
+        <p:cNvPr id="1" name="Shape 725"/>
+        <p:cNvGrpSpPr/>
+        <p:nvPr/>
+      </p:nvGrpSpPr>
+      <p:grpSpPr>
+        <a:xfrm>
+          <a:off x="0" y="0"/>
+          <a:ext cx="0" cy="0"/>
+          <a:chOff x="0" y="0"/>
+          <a:chExt cx="0" cy="0"/>
+        </a:xfrm>
+      </p:grpSpPr>
+      <p:sp>
+        <p:nvSpPr>
+          <p:cNvPr id="726" name="Google Shape;726;p63"/>
+          <p:cNvSpPr txBox="1">
+            <a:spLocks noGrp="1"/>
+          </p:cNvSpPr>
+          <p:nvPr>
+            <p:ph type="title"/>
+          </p:nvPr>
+        </p:nvSpPr>
+        <p:spPr>
+          <a:xfrm>
+            <a:off x="541323" y="2242294"/>
+            <a:ext cx="7704000" cy="572700"/>
+          </a:xfrm>
+          <a:prstGeom prst="rect">
+            <a:avLst/>
+          </a:prstGeom>
+        </p:spPr>
+        <p:txBody>
+          <a:bodyPr spcFirstLastPara="1" wrap="square" lIns="91425" tIns="91425" rIns="91425" bIns="91425" anchor="t" anchorCtr="0">
+            <a:noAutofit/>
+          </a:bodyPr>
+          <a:lstStyle/>
+          <a:p>
+            <a:pPr marL="0" lvl="0" indent="0" algn="ctr" rtl="0">
+              <a:spcBef>
+                <a:spcPts val="0"/>
+              </a:spcBef>
+              <a:spcAft>
+                <a:spcPts val="0"/>
+              </a:spcAft>
+              <a:buNone/>
+            </a:pPr>
+            <a:r>
+              <a:rPr lang="id-ID" dirty="0" smtClean="0"/>
+              <a:t>Terima Kasih</a:t>
+            </a:r>
+            <a:endParaRPr dirty="0"/>
+          </a:p>
+        </p:txBody>
+      </p:sp>
+    </p:spTree>
+    <p:extLst>
+      <p:ext uri="{BB962C8B-B14F-4D97-AF65-F5344CB8AC3E}">
+        <p14:creationId xmlns:p14="http://schemas.microsoft.com/office/powerpoint/2010/main" val="3531992725"/>
+      </p:ext>
+    </p:extLst>
   </p:cSld>
   <p:clrMapOvr>
     <a:masterClrMapping/>
@@ -21423,7 +21751,11 @@
             </a:r>
             <a:r>
               <a:rPr lang="id-ID" dirty="0" smtClean="0"/>
-              <a:t>spesialist, yang </a:t>
+              <a:t>spesialis, </a:t>
+            </a:r>
+            <a:r>
+              <a:rPr lang="id-ID" dirty="0" smtClean="0"/>
+              <a:t>yang </a:t>
             </a:r>
             <a:r>
               <a:rPr lang="id-ID" dirty="0"/>
@@ -21618,7 +21950,15 @@
                   <a:schemeClr val="dk1"/>
                 </a:solidFill>
               </a:rPr>
-              <a:t> Dokter Spesialist untuk mendapatkan saran dalam pembelian kebutuhan </a:t>
+              <a:t> Dokter Spesialist untuk mendapatkan saran dalam pembelian kebutuhan obat-obatan berkualitas untuk kesehatan yang seakan hal ini  menjadi gap (jarak) antara permintaan </a:t>
+            </a:r>
+            <a:r>
+              <a:rPr lang="en-US" dirty="0" smtClean="0">
+                <a:solidFill>
+                  <a:schemeClr val="dk1"/>
+                </a:solidFill>
+              </a:rPr>
+              <a:t>M</a:t>
             </a:r>
             <a:r>
               <a:rPr lang="id-ID" dirty="0" smtClean="0">
@@ -21626,7 +21966,7 @@
                   <a:schemeClr val="dk1"/>
                 </a:solidFill>
               </a:rPr>
-              <a:t>obat-obatan berkualitas </a:t>
+              <a:t>asyarakat </a:t>
             </a:r>
             <a:r>
               <a:rPr lang="id-ID" dirty="0" smtClean="0">
@@ -21634,7 +21974,59 @@
                   <a:schemeClr val="dk1"/>
                 </a:solidFill>
               </a:rPr>
-              <a:t>untuk kesehatan yang seakan hal ini  menjadi gap (jarak) antara permintaan masyarakat umum terhadap industri rumah sakit, maka saya selaku Siswa dari Bootcamp Code.id membuat Sistem Informasi yang bertujuan untuk mengisi gap (jarak) tersebut dengan menciptakan aplikasi Codigram.</a:t>
+              <a:t>umum terhadap </a:t>
+            </a:r>
+            <a:r>
+              <a:rPr lang="en-US" dirty="0"/>
+              <a:t>I</a:t>
+            </a:r>
+            <a:r>
+              <a:rPr lang="id-ID" dirty="0" smtClean="0">
+                <a:solidFill>
+                  <a:schemeClr val="dk1"/>
+                </a:solidFill>
+              </a:rPr>
+              <a:t>ndustri </a:t>
+            </a:r>
+            <a:r>
+              <a:rPr lang="en-US" dirty="0"/>
+              <a:t>R</a:t>
+            </a:r>
+            <a:r>
+              <a:rPr lang="id-ID" dirty="0" smtClean="0">
+                <a:solidFill>
+                  <a:schemeClr val="dk1"/>
+                </a:solidFill>
+              </a:rPr>
+              <a:t>umah </a:t>
+            </a:r>
+            <a:r>
+              <a:rPr lang="en-US" dirty="0" smtClean="0"/>
+              <a:t>S</a:t>
+            </a:r>
+            <a:r>
+              <a:rPr lang="id-ID" dirty="0" smtClean="0">
+                <a:solidFill>
+                  <a:schemeClr val="dk1"/>
+                </a:solidFill>
+              </a:rPr>
+              <a:t>akit</a:t>
+            </a:r>
+            <a:r>
+              <a:rPr lang="id-ID" dirty="0" smtClean="0">
+                <a:solidFill>
+                  <a:schemeClr val="dk1"/>
+                </a:solidFill>
+              </a:rPr>
+              <a:t>, maka saya selaku Siswa dari Bootcamp Code.id membuat Sistem Informasi yang bertujuan untuk mengisi gap (jarak) tersebut dengan menciptakan aplikasi Codigram</a:t>
+            </a:r>
+            <a:r>
+              <a:rPr lang="id-ID" dirty="0" smtClean="0">
+                <a:solidFill>
+                  <a:schemeClr val="dk1"/>
+                </a:solidFill>
+              </a:rPr>
+              <a:t>.</a:t>
             </a:r>
             <a:endParaRPr dirty="0" smtClean="0">
               <a:solidFill>
@@ -22225,15 +22617,7 @@
             </a:r>
             <a:r>
               <a:rPr lang="id-ID" dirty="0" smtClean="0"/>
-              <a:t>istem basis data </a:t>
-            </a:r>
-            <a:r>
-              <a:rPr lang="id-ID" dirty="0" smtClean="0"/>
-              <a:t>yang </a:t>
-            </a:r>
-            <a:r>
-              <a:rPr lang="id-ID" dirty="0" smtClean="0"/>
-              <a:t>secara open-source</a:t>
+              <a:t>istem basis data yang secara open-source</a:t>
             </a:r>
             <a:endParaRPr dirty="0"/>
           </a:p>

</xml_diff>

<commit_message>
Mengubah typo di PPT
</commit_message>
<xml_diff>
--- a/PPT Codigram.pptx
+++ b/PPT Codigram.pptx
@@ -16697,8 +16697,8 @@
               <a:buNone/>
             </a:pPr>
             <a:r>
-              <a:rPr lang="id-ID" dirty="0" smtClean="0"/>
-              <a:t>Server Side</a:t>
+              <a:rPr lang="en-US" dirty="0" smtClean="0"/>
+              <a:t>Back-End Tech</a:t>
             </a:r>
             <a:endParaRPr dirty="0"/>
           </a:p>
@@ -17805,8 +17805,8 @@
               <a:buNone/>
             </a:pPr>
             <a:r>
-              <a:rPr lang="id-ID" dirty="0" smtClean="0"/>
-              <a:t>Client Side</a:t>
+              <a:rPr lang="en-US" dirty="0" smtClean="0"/>
+              <a:t>Front-End Tech</a:t>
             </a:r>
             <a:endParaRPr dirty="0"/>
           </a:p>
@@ -19013,18 +19013,6 @@
               </a:spcAft>
               <a:buNone/>
             </a:pPr>
-            <a:r>
-              <a:rPr lang="en" sz="1600">
-                <a:solidFill>
-                  <a:schemeClr val="dk1"/>
-                </a:solidFill>
-                <a:latin typeface="Krona One"/>
-                <a:ea typeface="Krona One"/>
-                <a:cs typeface="Krona One"/>
-                <a:sym typeface="Krona One"/>
-              </a:rPr>
-              <a:t>3</a:t>
-            </a:r>
             <a:endParaRPr dirty="0"/>
           </a:p>
         </p:txBody>
@@ -19277,18 +19265,6 @@
               </a:spcAft>
               <a:buNone/>
             </a:pPr>
-            <a:r>
-              <a:rPr lang="en" sz="1600">
-                <a:solidFill>
-                  <a:schemeClr val="dk1"/>
-                </a:solidFill>
-                <a:latin typeface="Krona One"/>
-                <a:ea typeface="Krona One"/>
-                <a:cs typeface="Krona One"/>
-                <a:sym typeface="Krona One"/>
-              </a:rPr>
-              <a:t>4</a:t>
-            </a:r>
             <a:endParaRPr dirty="0"/>
           </a:p>
         </p:txBody>
@@ -21751,11 +21727,7 @@
             </a:r>
             <a:r>
               <a:rPr lang="id-ID" dirty="0" smtClean="0"/>
-              <a:t>spesialis, </a:t>
-            </a:r>
-            <a:r>
-              <a:rPr lang="id-ID" dirty="0" smtClean="0"/>
-              <a:t>yang </a:t>
+              <a:t>spesialis, yang </a:t>
             </a:r>
             <a:r>
               <a:rPr lang="id-ID" dirty="0"/>
@@ -21966,15 +21938,7 @@
                   <a:schemeClr val="dk1"/>
                 </a:solidFill>
               </a:rPr>
-              <a:t>asyarakat </a:t>
-            </a:r>
-            <a:r>
-              <a:rPr lang="id-ID" dirty="0" smtClean="0">
-                <a:solidFill>
-                  <a:schemeClr val="dk1"/>
-                </a:solidFill>
-              </a:rPr>
-              <a:t>umum terhadap </a:t>
+              <a:t>asyarakat umum terhadap </a:t>
             </a:r>
             <a:r>
               <a:rPr lang="en-US" dirty="0"/>
@@ -22010,23 +21974,7 @@
                   <a:schemeClr val="dk1"/>
                 </a:solidFill>
               </a:rPr>
-              <a:t>akit</a:t>
-            </a:r>
-            <a:r>
-              <a:rPr lang="id-ID" dirty="0" smtClean="0">
-                <a:solidFill>
-                  <a:schemeClr val="dk1"/>
-                </a:solidFill>
-              </a:rPr>
-              <a:t>, maka saya selaku Siswa dari Bootcamp Code.id membuat Sistem Informasi yang bertujuan untuk mengisi gap (jarak) tersebut dengan menciptakan aplikasi Codigram</a:t>
-            </a:r>
-            <a:r>
-              <a:rPr lang="id-ID" dirty="0" smtClean="0">
-                <a:solidFill>
-                  <a:schemeClr val="dk1"/>
-                </a:solidFill>
-              </a:rPr>
-              <a:t>.</a:t>
+              <a:t>akit, maka saya selaku Siswa dari Bootcamp Code.id membuat Sistem Informasi yang bertujuan untuk mengisi gap (jarak) tersebut dengan menciptakan aplikasi Codigram.</a:t>
             </a:r>
             <a:endParaRPr dirty="0" smtClean="0">
               <a:solidFill>

</xml_diff>